<commit_message>
move cyclist in top down figure
</commit_message>
<xml_diff>
--- a/img/top_down_fitting_slide.pptx
+++ b/img/top_down_fitting_slide.pptx
@@ -198,7 +198,7 @@
           <a:p>
             <a:fld id="{B2DDCB11-7C8F-4DF3-AAAF-6BDD1876932C}" type="datetimeFigureOut">
               <a:rPr lang="en-US" smtClean="0"/>
-              <a:t>6/10/2024</a:t>
+              <a:t>6/14/2024</a:t>
             </a:fld>
             <a:endParaRPr lang="en-US"/>
           </a:p>
@@ -720,7 +720,7 @@
           <a:p>
             <a:fld id="{C26389DF-7C87-4F65-9868-559F2AC6CA20}" type="datetimeFigureOut">
               <a:rPr lang="en-US" smtClean="0"/>
-              <a:t>6/10/2024</a:t>
+              <a:t>6/14/2024</a:t>
             </a:fld>
             <a:endParaRPr lang="en-US"/>
           </a:p>
@@ -890,7 +890,7 @@
           <a:p>
             <a:fld id="{C26389DF-7C87-4F65-9868-559F2AC6CA20}" type="datetimeFigureOut">
               <a:rPr lang="en-US" smtClean="0"/>
-              <a:t>6/10/2024</a:t>
+              <a:t>6/14/2024</a:t>
             </a:fld>
             <a:endParaRPr lang="en-US"/>
           </a:p>
@@ -1070,7 +1070,7 @@
           <a:p>
             <a:fld id="{C26389DF-7C87-4F65-9868-559F2AC6CA20}" type="datetimeFigureOut">
               <a:rPr lang="en-US" smtClean="0"/>
-              <a:t>6/10/2024</a:t>
+              <a:t>6/14/2024</a:t>
             </a:fld>
             <a:endParaRPr lang="en-US"/>
           </a:p>
@@ -1240,7 +1240,7 @@
           <a:p>
             <a:fld id="{C26389DF-7C87-4F65-9868-559F2AC6CA20}" type="datetimeFigureOut">
               <a:rPr lang="en-US" smtClean="0"/>
-              <a:t>6/10/2024</a:t>
+              <a:t>6/14/2024</a:t>
             </a:fld>
             <a:endParaRPr lang="en-US"/>
           </a:p>
@@ -1486,7 +1486,7 @@
           <a:p>
             <a:fld id="{C26389DF-7C87-4F65-9868-559F2AC6CA20}" type="datetimeFigureOut">
               <a:rPr lang="en-US" smtClean="0"/>
-              <a:t>6/10/2024</a:t>
+              <a:t>6/14/2024</a:t>
             </a:fld>
             <a:endParaRPr lang="en-US"/>
           </a:p>
@@ -1718,7 +1718,7 @@
           <a:p>
             <a:fld id="{C26389DF-7C87-4F65-9868-559F2AC6CA20}" type="datetimeFigureOut">
               <a:rPr lang="en-US" smtClean="0"/>
-              <a:t>6/10/2024</a:t>
+              <a:t>6/14/2024</a:t>
             </a:fld>
             <a:endParaRPr lang="en-US"/>
           </a:p>
@@ -2085,7 +2085,7 @@
           <a:p>
             <a:fld id="{C26389DF-7C87-4F65-9868-559F2AC6CA20}" type="datetimeFigureOut">
               <a:rPr lang="en-US" smtClean="0"/>
-              <a:t>6/10/2024</a:t>
+              <a:t>6/14/2024</a:t>
             </a:fld>
             <a:endParaRPr lang="en-US"/>
           </a:p>
@@ -2203,7 +2203,7 @@
           <a:p>
             <a:fld id="{C26389DF-7C87-4F65-9868-559F2AC6CA20}" type="datetimeFigureOut">
               <a:rPr lang="en-US" smtClean="0"/>
-              <a:t>6/10/2024</a:t>
+              <a:t>6/14/2024</a:t>
             </a:fld>
             <a:endParaRPr lang="en-US"/>
           </a:p>
@@ -2298,7 +2298,7 @@
           <a:p>
             <a:fld id="{C26389DF-7C87-4F65-9868-559F2AC6CA20}" type="datetimeFigureOut">
               <a:rPr lang="en-US" smtClean="0"/>
-              <a:t>6/10/2024</a:t>
+              <a:t>6/14/2024</a:t>
             </a:fld>
             <a:endParaRPr lang="en-US"/>
           </a:p>
@@ -2575,7 +2575,7 @@
           <a:p>
             <a:fld id="{C26389DF-7C87-4F65-9868-559F2AC6CA20}" type="datetimeFigureOut">
               <a:rPr lang="en-US" smtClean="0"/>
-              <a:t>6/10/2024</a:t>
+              <a:t>6/14/2024</a:t>
             </a:fld>
             <a:endParaRPr lang="en-US"/>
           </a:p>
@@ -2832,7 +2832,7 @@
           <a:p>
             <a:fld id="{C26389DF-7C87-4F65-9868-559F2AC6CA20}" type="datetimeFigureOut">
               <a:rPr lang="en-US" smtClean="0"/>
-              <a:t>6/10/2024</a:t>
+              <a:t>6/14/2024</a:t>
             </a:fld>
             <a:endParaRPr lang="en-US"/>
           </a:p>
@@ -3045,7 +3045,7 @@
           <a:p>
             <a:fld id="{C26389DF-7C87-4F65-9868-559F2AC6CA20}" type="datetimeFigureOut">
               <a:rPr lang="en-US" smtClean="0"/>
-              <a:t>6/10/2024</a:t>
+              <a:t>6/14/2024</a:t>
             </a:fld>
             <a:endParaRPr lang="en-US"/>
           </a:p>
@@ -4865,7 +4865,7 @@
         </p:nvSpPr>
         <p:spPr>
           <a:xfrm>
-            <a:off x="1758419" y="248579"/>
+            <a:off x="1758419" y="58069"/>
             <a:ext cx="801158" cy="553998"/>
           </a:xfrm>
           <a:prstGeom prst="rect">
@@ -6028,7 +6028,7 @@
         </p:blipFill>
         <p:spPr>
           <a:xfrm rot="10800000">
-            <a:off x="2542166" y="355068"/>
+            <a:off x="2542166" y="164558"/>
             <a:ext cx="161749" cy="308215"/>
           </a:xfrm>
           <a:prstGeom prst="rect">
@@ -6050,7 +6050,7 @@
         </p:nvSpPr>
         <p:spPr>
           <a:xfrm>
-            <a:off x="2532398" y="358152"/>
+            <a:off x="2532398" y="167642"/>
             <a:ext cx="184026" cy="291396"/>
           </a:xfrm>
           <a:prstGeom prst="rect">
@@ -6775,7 +6775,7 @@
         </p:blipFill>
         <p:spPr>
           <a:xfrm flipH="1">
-            <a:off x="3228748" y="149521"/>
+            <a:off x="3238274" y="163810"/>
             <a:ext cx="124800" cy="187200"/>
           </a:xfrm>
           <a:prstGeom prst="rect">
@@ -6797,7 +6797,7 @@
         </p:nvSpPr>
         <p:spPr>
           <a:xfrm>
-            <a:off x="3220739" y="127144"/>
+            <a:off x="3230265" y="141433"/>
             <a:ext cx="155611" cy="227924"/>
           </a:xfrm>
           <a:prstGeom prst="rect">
@@ -7766,7 +7766,7 @@
         </p:nvSpPr>
         <p:spPr>
           <a:xfrm>
-            <a:off x="2383678" y="568146"/>
+            <a:off x="2383678" y="377636"/>
             <a:ext cx="403174" cy="237360"/>
           </a:xfrm>
           <a:prstGeom prst="ellipse">
@@ -8222,7 +8222,7 @@
         </p:nvSpPr>
         <p:spPr>
           <a:xfrm>
-            <a:off x="3204297" y="122426"/>
+            <a:off x="3213823" y="136715"/>
             <a:ext cx="403174" cy="237360"/>
           </a:xfrm>
           <a:prstGeom prst="ellipse">

</xml_diff>